<commit_message>
Små justeringer på powerpoint
</commit_message>
<xml_diff>
--- a/intro.pptx
+++ b/intro.pptx
@@ -1138,6 +1138,99 @@
             </a:r>
             <a:endParaRPr lang="en-US" baseline="0" dirty="0" smtClean="0"/>
           </a:p>
+          <a:p>
+            <a:pPr marL="1085850" lvl="2" indent="-171450">
+              <a:buFont typeface="Arial"/>
+              <a:buChar char="•"/>
+            </a:pPr>
+            <a:r>
+              <a:rPr lang="en-US" baseline="0" dirty="0" err="1" smtClean="0"/>
+              <a:t>Tiden</a:t>
+            </a:r>
+            <a:r>
+              <a:rPr lang="en-US" baseline="0" dirty="0" smtClean="0"/>
+              <a:t> </a:t>
+            </a:r>
+            <a:r>
+              <a:rPr lang="en-US" baseline="0" dirty="0" err="1" smtClean="0"/>
+              <a:t>det</a:t>
+            </a:r>
+            <a:r>
+              <a:rPr lang="en-US" baseline="0" dirty="0" smtClean="0"/>
+              <a:t> tar </a:t>
+            </a:r>
+            <a:r>
+              <a:rPr lang="en-US" baseline="0" dirty="0" err="1" smtClean="0"/>
+              <a:t>å</a:t>
+            </a:r>
+            <a:r>
+              <a:rPr lang="en-US" baseline="0" dirty="0" smtClean="0"/>
+              <a:t> </a:t>
+            </a:r>
+            <a:r>
+              <a:rPr lang="en-US" baseline="0" dirty="0" err="1" smtClean="0"/>
+              <a:t>flytte</a:t>
+            </a:r>
+            <a:r>
+              <a:rPr lang="en-US" baseline="0" dirty="0" smtClean="0"/>
+              <a:t> data </a:t>
+            </a:r>
+            <a:r>
+              <a:rPr lang="en-US" baseline="0" dirty="0" err="1" smtClean="0"/>
+              <a:t>fra</a:t>
+            </a:r>
+            <a:r>
+              <a:rPr lang="en-US" baseline="0" dirty="0" smtClean="0"/>
+              <a:t> A </a:t>
+            </a:r>
+            <a:r>
+              <a:rPr lang="en-US" baseline="0" dirty="0" err="1" smtClean="0"/>
+              <a:t>til</a:t>
+            </a:r>
+            <a:r>
+              <a:rPr lang="en-US" baseline="0" dirty="0" smtClean="0"/>
+              <a:t> B</a:t>
+            </a:r>
+          </a:p>
+          <a:p>
+            <a:pPr marL="1085850" lvl="2" indent="-171450">
+              <a:buFont typeface="Arial"/>
+              <a:buChar char="•"/>
+            </a:pPr>
+            <a:r>
+              <a:rPr lang="en-US" baseline="0" dirty="0" smtClean="0"/>
+              <a:t>Bottleneck </a:t>
+            </a:r>
+            <a:r>
+              <a:rPr lang="en-US" baseline="0" dirty="0" err="1" smtClean="0"/>
+              <a:t>er</a:t>
+            </a:r>
+            <a:r>
+              <a:rPr lang="en-US" baseline="0" dirty="0" smtClean="0"/>
+              <a:t> </a:t>
+            </a:r>
+            <a:r>
+              <a:rPr lang="en-US" baseline="0" dirty="0" err="1" smtClean="0"/>
+              <a:t>nettet</a:t>
+            </a:r>
+            <a:r>
+              <a:rPr lang="en-US" baseline="0" dirty="0" smtClean="0"/>
+              <a:t> </a:t>
+            </a:r>
+            <a:r>
+              <a:rPr lang="en-US" baseline="0" dirty="0" err="1" smtClean="0"/>
+              <a:t>mellom</a:t>
+            </a:r>
+            <a:r>
+              <a:rPr lang="en-US" baseline="0" dirty="0" smtClean="0"/>
+              <a:t> </a:t>
+            </a:r>
+            <a:r>
+              <a:rPr lang="en-US" baseline="0" dirty="0" err="1" smtClean="0"/>
+              <a:t>nodene</a:t>
+            </a:r>
+            <a:endParaRPr lang="en-US" baseline="0" dirty="0" smtClean="0"/>
+          </a:p>
         </p:txBody>
       </p:sp>
       <p:sp>
@@ -1864,8 +1957,29 @@
             </a:r>
             <a:r>
               <a:rPr lang="en-US" dirty="0" smtClean="0"/>
-              <a:t> specs)</a:t>
-            </a:r>
+              <a:t> </a:t>
+            </a:r>
+            <a:r>
+              <a:rPr lang="en-US" dirty="0" smtClean="0"/>
+              <a:t>specs, </a:t>
+            </a:r>
+            <a:r>
+              <a:rPr lang="en-US" dirty="0" err="1" smtClean="0"/>
+              <a:t>mer</a:t>
+            </a:r>
+            <a:r>
+              <a:rPr lang="en-US" dirty="0" smtClean="0"/>
+              <a:t> </a:t>
+            </a:r>
+            <a:r>
+              <a:rPr lang="en-US" dirty="0" err="1" smtClean="0"/>
+              <a:t>realistiske</a:t>
+            </a:r>
+            <a:r>
+              <a:rPr lang="en-US" dirty="0" smtClean="0"/>
+              <a:t>)</a:t>
+            </a:r>
+            <a:endParaRPr lang="en-US" dirty="0" smtClean="0"/>
           </a:p>
           <a:p>
             <a:pPr marL="554038" lvl="1" indent="-285750">
@@ -1887,8 +2001,13 @@
             </a:pPr>
             <a:r>
               <a:rPr lang="en-US" dirty="0" smtClean="0"/>
-              <a:t>2014: Google Compute Engine (50 nodes)</a:t>
-            </a:r>
+              <a:t>2014: Google Compute Engine (50 </a:t>
+            </a:r>
+            <a:r>
+              <a:rPr lang="en-US" dirty="0" smtClean="0"/>
+              <a:t>compute engines)</a:t>
+            </a:r>
+            <a:endParaRPr lang="en-US" dirty="0" smtClean="0"/>
           </a:p>
           <a:p>
             <a:pPr marL="554038" lvl="1" indent="-285750">
@@ -2222,7 +2341,7 @@
               <a:t> </a:t>
             </a:r>
             <a:r>
-              <a:rPr lang="en-US" baseline="0" smtClean="0"/>
+              <a:rPr lang="en-US" baseline="0" dirty="0" err="1" smtClean="0"/>
               <a:t>ned</a:t>
             </a:r>
             <a:endParaRPr lang="en-US" dirty="0"/>
@@ -19364,6 +19483,13 @@
   <p:transition xmlns:p14="http://schemas.microsoft.com/office/powerpoint/2010/main">
     <p:fade thruBlk="1"/>
   </p:transition>
+  <p:timing>
+    <p:tnLst>
+      <p:par>
+        <p:cTn xmlns:p14="http://schemas.microsoft.com/office/powerpoint/2010/main" id="1" dur="indefinite" restart="never" nodeType="tmRoot"/>
+      </p:par>
+    </p:tnLst>
+  </p:timing>
 </p:sld>
 </file>
 
@@ -19471,6 +19597,13 @@
   <p:transition xmlns:p14="http://schemas.microsoft.com/office/powerpoint/2010/main">
     <p:fade thruBlk="1"/>
   </p:transition>
+  <p:timing>
+    <p:tnLst>
+      <p:par>
+        <p:cTn xmlns:p14="http://schemas.microsoft.com/office/powerpoint/2010/main" id="1" dur="indefinite" restart="never" nodeType="tmRoot"/>
+      </p:par>
+    </p:tnLst>
+  </p:timing>
 </p:sld>
 </file>
 
@@ -24376,6 +24509,13 @@
   <p:transition xmlns:p14="http://schemas.microsoft.com/office/powerpoint/2010/main">
     <p:fade thruBlk="1"/>
   </p:transition>
+  <p:timing>
+    <p:tnLst>
+      <p:par>
+        <p:cTn xmlns:p14="http://schemas.microsoft.com/office/powerpoint/2010/main" id="1" dur="indefinite" restart="never" nodeType="tmRoot"/>
+      </p:par>
+    </p:tnLst>
+  </p:timing>
 </p:sld>
 </file>
 
@@ -24433,12 +24573,19 @@
             </a:pPr>
             <a:r>
               <a:rPr lang="en-US" dirty="0" smtClean="0"/>
-              <a:t>Eventual </a:t>
-            </a:r>
-            <a:r>
-              <a:rPr lang="en-US" dirty="0" smtClean="0"/>
-              <a:t>consistent</a:t>
-            </a:r>
+              <a:t>Eventually consistent</a:t>
+            </a:r>
+          </a:p>
+          <a:p>
+            <a:pPr marL="554038" lvl="1" indent="-285750">
+              <a:buFont typeface="Arial"/>
+              <a:buChar char="•"/>
+            </a:pPr>
+            <a:r>
+              <a:rPr lang="en-US" dirty="0" smtClean="0"/>
+              <a:t>Tunable consistency</a:t>
+            </a:r>
+            <a:endParaRPr lang="en-US" dirty="0" smtClean="0"/>
           </a:p>
           <a:p>
             <a:pPr marL="285750" indent="-285750">
@@ -24468,6 +24615,20 @@
             <a:r>
               <a:rPr lang="en-US" dirty="0" smtClean="0"/>
               <a:t>2008</a:t>
+            </a:r>
+          </a:p>
+          <a:p>
+            <a:pPr marL="285750" indent="-285750">
+              <a:buFont typeface="Arial"/>
+              <a:buChar char="•"/>
+            </a:pPr>
+            <a:r>
+              <a:rPr lang="en-US" dirty="0" err="1" smtClean="0"/>
+              <a:t>Aktivt</a:t>
+            </a:r>
+            <a:r>
+              <a:rPr lang="en-US" dirty="0" smtClean="0"/>
+              <a:t> community</a:t>
             </a:r>
           </a:p>
         </p:txBody>
@@ -24529,6 +24690,13 @@
   <p:transition xmlns:p14="http://schemas.microsoft.com/office/powerpoint/2010/main">
     <p:fade thruBlk="1"/>
   </p:transition>
+  <p:timing>
+    <p:tnLst>
+      <p:par>
+        <p:cTn xmlns:p14="http://schemas.microsoft.com/office/powerpoint/2010/main" id="1" dur="indefinite" restart="never" nodeType="tmRoot"/>
+      </p:par>
+    </p:tnLst>
+  </p:timing>
 </p:sld>
 </file>
 
@@ -24559,14 +24727,14 @@
             <p:ph idx="1"/>
             <p:extLst>
               <p:ext uri="{D42A27DB-BD31-4B8C-83A1-F6EECF244321}">
-                <p14:modId xmlns:p14="http://schemas.microsoft.com/office/powerpoint/2010/main" val="1742409920"/>
+                <p14:modId xmlns:p14="http://schemas.microsoft.com/office/powerpoint/2010/main" val="2131856085"/>
               </p:ext>
             </p:extLst>
           </p:nvPr>
         </p:nvGraphicFramePr>
         <p:xfrm>
           <a:off x="387350" y="1039813"/>
-          <a:ext cx="8353424" cy="1483360"/>
+          <a:ext cx="8353424" cy="1112520"/>
         </p:xfrm>
         <a:graphic>
           <a:graphicData uri="http://schemas.openxmlformats.org/drawingml/2006/table">
@@ -24724,6 +24892,10 @@
                     <a:bodyPr/>
                     <a:lstStyle/>
                     <a:p>
+                      <a:r>
+                        <a:rPr lang="en-US" sz="1400" dirty="0" err="1" smtClean="0"/>
+                        <a:t>TitanDB</a:t>
+                      </a:r>
                       <a:endParaRPr lang="en-US" sz="1400" dirty="0"/>
                     </a:p>
                   </a:txBody>
@@ -24758,56 +24930,6 @@
                   <a:tcPr/>
                 </a:tc>
               </a:tr>
-              <a:tr h="370840">
-                <a:tc>
-                  <a:txBody>
-                    <a:bodyPr/>
-                    <a:lstStyle/>
-                    <a:p>
-                      <a:endParaRPr lang="en-US" sz="1400" dirty="0"/>
-                    </a:p>
-                  </a:txBody>
-                  <a:tcPr/>
-                </a:tc>
-                <a:tc>
-                  <a:txBody>
-                    <a:bodyPr/>
-                    <a:lstStyle/>
-                    <a:p>
-                      <a:endParaRPr lang="en-US" sz="1400" dirty="0"/>
-                    </a:p>
-                  </a:txBody>
-                  <a:tcPr/>
-                </a:tc>
-                <a:tc>
-                  <a:txBody>
-                    <a:bodyPr/>
-                    <a:lstStyle/>
-                    <a:p>
-                      <a:r>
-                        <a:rPr lang="en-US" sz="1400" dirty="0" err="1" smtClean="0"/>
-                        <a:t>Memcached</a:t>
-                      </a:r>
-                      <a:endParaRPr lang="en-US" sz="1400" dirty="0"/>
-                    </a:p>
-                  </a:txBody>
-                  <a:tcPr/>
-                </a:tc>
-                <a:tc>
-                  <a:txBody>
-                    <a:bodyPr/>
-                    <a:lstStyle/>
-                    <a:p>
-                      <a:r>
-                        <a:rPr lang="en-US" sz="1400" dirty="0" err="1" smtClean="0"/>
-                        <a:t>Hypertable</a:t>
-                      </a:r>
-                      <a:endParaRPr lang="en-US" sz="1400" dirty="0"/>
-                    </a:p>
-                  </a:txBody>
-                  <a:tcPr/>
-                </a:tc>
-              </a:tr>
             </a:tbl>
           </a:graphicData>
         </a:graphic>
@@ -24869,6 +24991,13 @@
   <p:transition xmlns:p14="http://schemas.microsoft.com/office/powerpoint/2010/main">
     <p:fade thruBlk="1"/>
   </p:transition>
+  <p:timing>
+    <p:tnLst>
+      <p:par>
+        <p:cTn xmlns:p14="http://schemas.microsoft.com/office/powerpoint/2010/main" id="1" dur="indefinite" restart="never" nodeType="tmRoot"/>
+      </p:par>
+    </p:tnLst>
+  </p:timing>
 </p:sld>
 </file>
 
@@ -25220,6 +25349,13 @@
   <p:transition xmlns:p14="http://schemas.microsoft.com/office/powerpoint/2010/main">
     <p:fade thruBlk="1"/>
   </p:transition>
+  <p:timing>
+    <p:tnLst>
+      <p:par>
+        <p:cTn xmlns:p14="http://schemas.microsoft.com/office/powerpoint/2010/main" id="1" dur="indefinite" restart="never" nodeType="tmRoot"/>
+      </p:par>
+    </p:tnLst>
+  </p:timing>
 </p:sld>
 </file>
 
@@ -25281,6 +25417,13 @@
   <p:transition xmlns:p14="http://schemas.microsoft.com/office/powerpoint/2010/main">
     <p:fade thruBlk="1"/>
   </p:transition>
+  <p:timing>
+    <p:tnLst>
+      <p:par>
+        <p:cTn xmlns:p14="http://schemas.microsoft.com/office/powerpoint/2010/main" id="1" dur="indefinite" restart="never" nodeType="tmRoot"/>
+      </p:par>
+    </p:tnLst>
+  </p:timing>
 </p:sld>
 </file>
 
@@ -25321,8 +25464,12 @@
               <a:buChar char="•"/>
             </a:pPr>
             <a:r>
-              <a:rPr lang="en-US" dirty="0" smtClean="0"/>
-              <a:t>Time series data</a:t>
+              <a:rPr lang="en-US" b="1" dirty="0" smtClean="0"/>
+              <a:t>Time series </a:t>
+            </a:r>
+            <a:r>
+              <a:rPr lang="en-US" b="1" dirty="0" smtClean="0"/>
+              <a:t>data</a:t>
             </a:r>
           </a:p>
           <a:p>
@@ -25332,7 +25479,11 @@
             </a:pPr>
             <a:r>
               <a:rPr lang="en-US" dirty="0" smtClean="0"/>
-              <a:t>Internet of Things</a:t>
+              <a:t>Internet </a:t>
+            </a:r>
+            <a:r>
+              <a:rPr lang="en-US" dirty="0" smtClean="0"/>
+              <a:t>of Things</a:t>
             </a:r>
           </a:p>
           <a:p>
@@ -25474,6 +25625,13 @@
   <p:transition xmlns:p14="http://schemas.microsoft.com/office/powerpoint/2010/main">
     <p:fade thruBlk="1"/>
   </p:transition>
+  <p:timing>
+    <p:tnLst>
+      <p:par>
+        <p:cTn xmlns:p14="http://schemas.microsoft.com/office/powerpoint/2010/main" id="1" dur="indefinite" restart="never" nodeType="tmRoot"/>
+      </p:par>
+    </p:tnLst>
+  </p:timing>
 </p:sld>
 </file>
 
@@ -25625,7 +25783,7 @@
         <p:spPr>
           <a:xfrm>
             <a:off x="376445" y="294936"/>
-            <a:ext cx="2066755" cy="261610"/>
+            <a:ext cx="3033279" cy="261610"/>
           </a:xfrm>
         </p:spPr>
         <p:txBody>
@@ -25634,7 +25792,7 @@
           <a:p>
             <a:r>
               <a:rPr lang="en-US" dirty="0" err="1" smtClean="0"/>
-              <a:t>Har</a:t>
+              <a:t>Vurder</a:t>
             </a:r>
             <a:r>
               <a:rPr lang="en-US" dirty="0" smtClean="0"/>
@@ -25642,10 +25800,18 @@
             </a:r>
             <a:r>
               <a:rPr lang="en-US" dirty="0" err="1" smtClean="0"/>
+              <a:t>ved</a:t>
+            </a:r>
+            <a:r>
+              <a:rPr lang="en-US" dirty="0" smtClean="0"/>
+              <a:t> </a:t>
+            </a:r>
+            <a:r>
+              <a:rPr lang="en-US" dirty="0" err="1" smtClean="0"/>
               <a:t>behov</a:t>
             </a:r>
             <a:r>
-              <a:rPr lang="en-US" smtClean="0"/>
+              <a:rPr lang="en-US" dirty="0" smtClean="0"/>
               <a:t> for</a:t>
             </a:r>
             <a:endParaRPr lang="en-US" dirty="0"/>
@@ -25665,6 +25831,13 @@
   <p:transition xmlns:p14="http://schemas.microsoft.com/office/powerpoint/2010/main">
     <p:fade thruBlk="1"/>
   </p:transition>
+  <p:timing>
+    <p:tnLst>
+      <p:par>
+        <p:cTn xmlns:p14="http://schemas.microsoft.com/office/powerpoint/2010/main" id="1" dur="indefinite" restart="never" nodeType="tmRoot"/>
+      </p:par>
+    </p:tnLst>
+  </p:timing>
 </p:sld>
 </file>
 
@@ -25708,25 +25881,6 @@
           </a:p>
         </p:txBody>
       </p:sp>
-      <p:sp>
-        <p:nvSpPr>
-          <p:cNvPr id="3" name="Subtitle 2"/>
-          <p:cNvSpPr>
-            <a:spLocks noGrp="1"/>
-          </p:cNvSpPr>
-          <p:nvPr>
-            <p:ph type="subTitle" idx="1"/>
-          </p:nvPr>
-        </p:nvSpPr>
-        <p:spPr/>
-        <p:txBody>
-          <a:bodyPr/>
-          <a:lstStyle/>
-          <a:p>
-            <a:endParaRPr lang="en-US" dirty="0"/>
-          </a:p>
-        </p:txBody>
-      </p:sp>
     </p:spTree>
     <p:extLst>
       <p:ext uri="{BB962C8B-B14F-4D97-AF65-F5344CB8AC3E}">
@@ -25740,6 +25894,13 @@
   <p:transition xmlns:p14="http://schemas.microsoft.com/office/powerpoint/2010/main">
     <p:fade thruBlk="1"/>
   </p:transition>
+  <p:timing>
+    <p:tnLst>
+      <p:par>
+        <p:cTn xmlns:p14="http://schemas.microsoft.com/office/powerpoint/2010/main" id="1" dur="indefinite" restart="never" nodeType="tmRoot"/>
+      </p:par>
+    </p:tnLst>
+  </p:timing>
 </p:sld>
 </file>
 
@@ -25842,6 +26003,13 @@
   <p:transition xmlns:p14="http://schemas.microsoft.com/office/powerpoint/2010/main">
     <p:fade thruBlk="1"/>
   </p:transition>
+  <p:timing>
+    <p:tnLst>
+      <p:par>
+        <p:cTn xmlns:p14="http://schemas.microsoft.com/office/powerpoint/2010/main" id="1" dur="indefinite" restart="never" nodeType="tmRoot"/>
+      </p:par>
+    </p:tnLst>
+  </p:timing>
 </p:sld>
 </file>
 

</xml_diff>

<commit_message>
Clusternavn og presentasjon endret
</commit_message>
<xml_diff>
--- a/intro.pptx
+++ b/intro.pptx
@@ -1043,7 +1043,7 @@
             </a:r>
             <a:r>
               <a:rPr lang="en-US" baseline="0" dirty="0" err="1" smtClean="0"/>
-              <a:t>basen</a:t>
+              <a:t>dataene</a:t>
             </a:r>
             <a:r>
               <a:rPr lang="en-US" baseline="0" dirty="0" smtClean="0"/>
@@ -1349,7 +1349,7 @@
             </a:r>
             <a:r>
               <a:rPr lang="en-US" baseline="0" dirty="0" smtClean="0"/>
-              <a:t> </a:t>
+              <a:t>- </a:t>
             </a:r>
             <a:r>
               <a:rPr lang="en-US" baseline="0" dirty="0" err="1" smtClean="0"/>
@@ -1357,11 +1357,46 @@
             </a:r>
             <a:r>
               <a:rPr lang="en-US" baseline="0" dirty="0" smtClean="0"/>
-              <a:t> key-value-</a:t>
+              <a:t> </a:t>
+            </a:r>
+            <a:r>
+              <a:rPr lang="en-US" baseline="0" dirty="0" smtClean="0"/>
+              <a:t>key-value-</a:t>
             </a:r>
             <a:r>
               <a:rPr lang="en-US" baseline="0" dirty="0" err="1" smtClean="0"/>
               <a:t>modell</a:t>
+            </a:r>
+            <a:endParaRPr lang="en-US" baseline="0" dirty="0" smtClean="0"/>
+          </a:p>
+          <a:p>
+            <a:pPr marL="171450" indent="-171450">
+              <a:buFont typeface="Arial"/>
+              <a:buChar char="•"/>
+            </a:pPr>
+            <a:r>
+              <a:rPr lang="en-US" baseline="0" dirty="0" smtClean="0"/>
+              <a:t>Cassandra </a:t>
+            </a:r>
+            <a:r>
+              <a:rPr lang="en-US" baseline="0" dirty="0" err="1" smtClean="0"/>
+              <a:t>er</a:t>
+            </a:r>
+            <a:r>
+              <a:rPr lang="en-US" baseline="0" dirty="0" smtClean="0"/>
+              <a:t> </a:t>
+            </a:r>
+            <a:r>
+              <a:rPr lang="en-US" baseline="0" dirty="0" err="1" smtClean="0"/>
+              <a:t>basert</a:t>
+            </a:r>
+            <a:r>
+              <a:rPr lang="en-US" baseline="0" dirty="0" smtClean="0"/>
+              <a:t> </a:t>
+            </a:r>
+            <a:r>
+              <a:rPr lang="en-US" baseline="0" dirty="0" err="1" smtClean="0"/>
+              <a:t>på</a:t>
             </a:r>
             <a:endParaRPr lang="en-US" baseline="0" dirty="0" smtClean="0"/>
           </a:p>
@@ -1372,21 +1407,24 @@
             </a:pPr>
             <a:r>
               <a:rPr lang="en-US" baseline="0" dirty="0" smtClean="0"/>
-              <a:t>Tables </a:t>
-            </a:r>
-            <a:r>
-              <a:rPr lang="en-US" baseline="0" dirty="0" err="1" smtClean="0"/>
-              <a:t>fra</a:t>
-            </a:r>
-            <a:r>
-              <a:rPr lang="en-US" baseline="0" dirty="0" smtClean="0"/>
-              <a:t> Google’s </a:t>
+              <a:t>Google’s </a:t>
             </a:r>
             <a:r>
               <a:rPr lang="en-US" baseline="0" dirty="0" err="1" smtClean="0"/>
               <a:t>BigTable</a:t>
             </a:r>
-            <a:endParaRPr lang="en-US" baseline="0" dirty="0" smtClean="0"/>
+            <a:r>
+              <a:rPr lang="en-US" baseline="0" dirty="0" smtClean="0"/>
+              <a:t> (Tables-</a:t>
+            </a:r>
+            <a:r>
+              <a:rPr lang="en-US" baseline="0" dirty="0" err="1" smtClean="0"/>
+              <a:t>modell</a:t>
+            </a:r>
+            <a:r>
+              <a:rPr lang="en-US" baseline="0" dirty="0" smtClean="0"/>
+              <a:t>)</a:t>
+            </a:r>
           </a:p>
           <a:p>
             <a:pPr marL="628650" lvl="1" indent="-171450">
@@ -1395,15 +1433,15 @@
             </a:pPr>
             <a:r>
               <a:rPr lang="en-US" baseline="0" dirty="0" smtClean="0"/>
-              <a:t>Key-value </a:t>
+              <a:t>Amazon’s Dynamo (Key-value </a:t>
             </a:r>
             <a:r>
               <a:rPr lang="en-US" baseline="0" dirty="0" err="1" smtClean="0"/>
-              <a:t>fra</a:t>
+              <a:t>modell</a:t>
             </a:r>
             <a:r>
               <a:rPr lang="en-US" baseline="0" dirty="0" smtClean="0"/>
-              <a:t> Amazon’s Dynamo</a:t>
+              <a:t>)</a:t>
             </a:r>
             <a:endParaRPr lang="en-US" dirty="0"/>
           </a:p>
@@ -25701,6 +25739,22 @@
             <a:r>
               <a:rPr lang="en-US" dirty="0" err="1" smtClean="0"/>
               <a:t>skalering</a:t>
+            </a:r>
+            <a:r>
+              <a:rPr lang="en-US" dirty="0" smtClean="0"/>
+              <a:t> </a:t>
+            </a:r>
+            <a:r>
+              <a:rPr lang="en-US" dirty="0" err="1" smtClean="0"/>
+              <a:t>av</a:t>
+            </a:r>
+            <a:r>
+              <a:rPr lang="en-US" dirty="0" smtClean="0"/>
+              <a:t> </a:t>
+            </a:r>
+            <a:r>
+              <a:rPr lang="en-US" dirty="0" err="1" smtClean="0"/>
+              <a:t>noder</a:t>
             </a:r>
             <a:endParaRPr lang="en-US" dirty="0" smtClean="0"/>
           </a:p>

</xml_diff>

<commit_message>
Endring i presentasjon. Nye cql statements for singlenode
</commit_message>
<xml_diff>
--- a/intro.pptx
+++ b/intro.pptx
@@ -17,8 +17,8 @@
     <p:sldId id="262" r:id="rId8"/>
     <p:sldId id="263" r:id="rId9"/>
     <p:sldId id="275" r:id="rId10"/>
-    <p:sldId id="268" r:id="rId11"/>
-    <p:sldId id="273" r:id="rId12"/>
+    <p:sldId id="273" r:id="rId11"/>
+    <p:sldId id="268" r:id="rId12"/>
   </p:sldIdLst>
   <p:sldSz cx="9144000" cy="5143500" type="screen16x9"/>
   <p:notesSz cx="6858000" cy="9144000"/>
@@ -514,11 +514,245 @@
           <a:bodyPr/>
           <a:lstStyle/>
           <a:p>
-            <a:pPr marL="0" indent="0">
-              <a:buFontTx/>
-              <a:buNone/>
+            <a:pPr marL="171450" indent="-171450">
+              <a:buFont typeface="Arial"/>
+              <a:buChar char="•"/>
             </a:pPr>
-            <a:endParaRPr lang="en-US" dirty="0"/>
+            <a:r>
+              <a:rPr lang="en-US" baseline="0" dirty="0" smtClean="0"/>
+              <a:t>Plan:</a:t>
+            </a:r>
+          </a:p>
+          <a:p>
+            <a:pPr marL="628650" lvl="1" indent="-171450">
+              <a:buFont typeface="Arial"/>
+              <a:buChar char="•"/>
+            </a:pPr>
+            <a:r>
+              <a:rPr lang="en-US" baseline="0" dirty="0" err="1" smtClean="0"/>
+              <a:t>Kort</a:t>
+            </a:r>
+            <a:r>
+              <a:rPr lang="en-US" baseline="0" dirty="0" smtClean="0"/>
+              <a:t> intro</a:t>
+            </a:r>
+          </a:p>
+          <a:p>
+            <a:pPr marL="1085850" marR="0" lvl="2" indent="-171450" algn="l" defTabSz="457200" rtl="0" eaLnBrk="1" fontAlgn="auto" latinLnBrk="0" hangingPunct="1">
+              <a:lnSpc>
+                <a:spcPct val="100000"/>
+              </a:lnSpc>
+              <a:spcBef>
+                <a:spcPts val="0"/>
+              </a:spcBef>
+              <a:spcAft>
+                <a:spcPts val="0"/>
+              </a:spcAft>
+              <a:buClrTx/>
+              <a:buSzTx/>
+              <a:buFont typeface="Arial"/>
+              <a:buChar char="•"/>
+              <a:tabLst/>
+              <a:defRPr/>
+            </a:pPr>
+            <a:r>
+              <a:rPr lang="en-US" baseline="0" smtClean="0"/>
+              <a:t>Overordnet</a:t>
+            </a:r>
+            <a:endParaRPr lang="en-US" baseline="0" dirty="0" smtClean="0"/>
+          </a:p>
+          <a:p>
+            <a:pPr marL="1085850" lvl="2" indent="-171450">
+              <a:buFont typeface="Arial"/>
+              <a:buChar char="•"/>
+            </a:pPr>
+            <a:r>
+              <a:rPr lang="en-US" baseline="0" dirty="0" err="1" smtClean="0"/>
+              <a:t>Ikke</a:t>
+            </a:r>
+            <a:r>
+              <a:rPr lang="en-US" baseline="0" dirty="0" smtClean="0"/>
+              <a:t> </a:t>
+            </a:r>
+            <a:r>
+              <a:rPr lang="en-US" baseline="0" dirty="0" err="1" smtClean="0"/>
+              <a:t>veldig</a:t>
+            </a:r>
+            <a:r>
+              <a:rPr lang="en-US" baseline="0" dirty="0" smtClean="0"/>
+              <a:t> </a:t>
+            </a:r>
+            <a:r>
+              <a:rPr lang="en-US" baseline="0" dirty="0" err="1" smtClean="0"/>
+              <a:t>detaljert</a:t>
+            </a:r>
+            <a:endParaRPr lang="en-US" baseline="0" dirty="0" smtClean="0"/>
+          </a:p>
+          <a:p>
+            <a:pPr marL="1085850" lvl="2" indent="-171450">
+              <a:buFont typeface="Arial"/>
+              <a:buChar char="•"/>
+            </a:pPr>
+            <a:r>
+              <a:rPr lang="en-US" baseline="0" dirty="0" err="1" smtClean="0"/>
+              <a:t>Fokus</a:t>
+            </a:r>
+            <a:r>
+              <a:rPr lang="en-US" baseline="0" dirty="0" smtClean="0"/>
+              <a:t> </a:t>
+            </a:r>
+            <a:r>
+              <a:rPr lang="en-US" baseline="0" dirty="0" err="1" smtClean="0"/>
+              <a:t>på</a:t>
+            </a:r>
+            <a:r>
+              <a:rPr lang="en-US" baseline="0" dirty="0" smtClean="0"/>
+              <a:t> </a:t>
+            </a:r>
+            <a:r>
+              <a:rPr lang="en-US" baseline="0" dirty="0" err="1" smtClean="0"/>
+              <a:t>å</a:t>
+            </a:r>
+            <a:r>
+              <a:rPr lang="en-US" baseline="0" dirty="0" smtClean="0"/>
+              <a:t> </a:t>
+            </a:r>
+            <a:r>
+              <a:rPr lang="en-US" baseline="0" dirty="0" err="1" smtClean="0"/>
+              <a:t>sette</a:t>
+            </a:r>
+            <a:r>
+              <a:rPr lang="en-US" baseline="0" dirty="0" smtClean="0"/>
+              <a:t> </a:t>
+            </a:r>
+            <a:r>
+              <a:rPr lang="en-US" baseline="0" dirty="0" err="1" smtClean="0"/>
+              <a:t>opp</a:t>
+            </a:r>
+            <a:r>
+              <a:rPr lang="en-US" baseline="0" dirty="0" smtClean="0"/>
+              <a:t> et cluster</a:t>
+            </a:r>
+          </a:p>
+          <a:p>
+            <a:pPr marL="628650" lvl="1" indent="-171450">
+              <a:buFont typeface="Arial"/>
+              <a:buChar char="•"/>
+            </a:pPr>
+            <a:r>
+              <a:rPr lang="en-US" baseline="0" dirty="0" err="1" smtClean="0"/>
+              <a:t>Sette</a:t>
+            </a:r>
+            <a:r>
+              <a:rPr lang="en-US" baseline="0" dirty="0" smtClean="0"/>
+              <a:t> </a:t>
+            </a:r>
+            <a:r>
+              <a:rPr lang="en-US" baseline="0" dirty="0" err="1" smtClean="0"/>
+              <a:t>opp</a:t>
+            </a:r>
+            <a:r>
+              <a:rPr lang="en-US" baseline="0" dirty="0" smtClean="0"/>
+              <a:t> single node cluster</a:t>
+            </a:r>
+          </a:p>
+          <a:p>
+            <a:pPr marL="628650" lvl="1" indent="-171450">
+              <a:buFont typeface="Arial"/>
+              <a:buChar char="•"/>
+            </a:pPr>
+            <a:r>
+              <a:rPr lang="en-US" baseline="0" dirty="0" err="1" smtClean="0"/>
+              <a:t>Sette</a:t>
+            </a:r>
+            <a:r>
+              <a:rPr lang="en-US" baseline="0" dirty="0" smtClean="0"/>
+              <a:t> </a:t>
+            </a:r>
+            <a:r>
+              <a:rPr lang="en-US" baseline="0" dirty="0" err="1" smtClean="0"/>
+              <a:t>opp</a:t>
+            </a:r>
+            <a:r>
+              <a:rPr lang="en-US" baseline="0" dirty="0" smtClean="0"/>
+              <a:t> multi node cluster</a:t>
+            </a:r>
+          </a:p>
+          <a:p>
+            <a:pPr marL="1085850" lvl="2" indent="-171450">
+              <a:buFont typeface="Arial"/>
+              <a:buChar char="•"/>
+            </a:pPr>
+            <a:r>
+              <a:rPr lang="en-US" baseline="0" dirty="0" err="1" smtClean="0"/>
+              <a:t>Visualisere</a:t>
+            </a:r>
+            <a:endParaRPr lang="en-US" baseline="0" dirty="0" smtClean="0"/>
+          </a:p>
+          <a:p>
+            <a:pPr marL="1085850" lvl="2" indent="-171450">
+              <a:buFont typeface="Arial"/>
+              <a:buChar char="•"/>
+            </a:pPr>
+            <a:r>
+              <a:rPr lang="en-US" baseline="0" dirty="0" err="1" smtClean="0"/>
+              <a:t>Legge</a:t>
+            </a:r>
+            <a:r>
+              <a:rPr lang="en-US" baseline="0" dirty="0" smtClean="0"/>
+              <a:t> </a:t>
+            </a:r>
+            <a:r>
+              <a:rPr lang="en-US" baseline="0" dirty="0" err="1" smtClean="0"/>
+              <a:t>til</a:t>
+            </a:r>
+            <a:r>
+              <a:rPr lang="en-US" baseline="0" dirty="0" smtClean="0"/>
+              <a:t> / </a:t>
+            </a:r>
+            <a:r>
+              <a:rPr lang="en-US" baseline="0" dirty="0" err="1" smtClean="0"/>
+              <a:t>fjerne</a:t>
+            </a:r>
+            <a:r>
+              <a:rPr lang="en-US" baseline="0" dirty="0" smtClean="0"/>
+              <a:t> </a:t>
+            </a:r>
+            <a:r>
+              <a:rPr lang="en-US" baseline="0" dirty="0" err="1" smtClean="0"/>
+              <a:t>noder</a:t>
+            </a:r>
+            <a:endParaRPr lang="en-US" baseline="0" dirty="0" smtClean="0"/>
+          </a:p>
+          <a:p>
+            <a:pPr marL="1085850" lvl="2" indent="-171450">
+              <a:buFont typeface="Arial"/>
+              <a:buChar char="•"/>
+            </a:pPr>
+            <a:r>
+              <a:rPr lang="en-US" baseline="0" dirty="0" err="1" smtClean="0"/>
+              <a:t>Spørre</a:t>
+            </a:r>
+            <a:r>
+              <a:rPr lang="en-US" baseline="0" dirty="0" smtClean="0"/>
+              <a:t> </a:t>
+            </a:r>
+            <a:r>
+              <a:rPr lang="en-US" baseline="0" dirty="0" err="1" smtClean="0"/>
+              <a:t>på</a:t>
+            </a:r>
+            <a:r>
+              <a:rPr lang="en-US" baseline="0" dirty="0" smtClean="0"/>
+              <a:t> </a:t>
+            </a:r>
+            <a:r>
+              <a:rPr lang="en-US" baseline="0" dirty="0" err="1" smtClean="0"/>
+              <a:t>dataene</a:t>
+            </a:r>
+            <a:r>
+              <a:rPr lang="en-US" baseline="0" dirty="0" smtClean="0"/>
+              <a:t> (?)</a:t>
+            </a:r>
           </a:p>
         </p:txBody>
       </p:sp>
@@ -607,81 +841,22 @@
               <a:buChar char="•"/>
             </a:pPr>
             <a:r>
-              <a:rPr lang="en-US" b="1" dirty="0" smtClean="0"/>
-              <a:t>PK:</a:t>
-            </a:r>
-            <a:r>
-              <a:rPr lang="en-US" b="1" baseline="0" dirty="0" smtClean="0"/>
-              <a:t> Primary key</a:t>
-            </a:r>
-          </a:p>
-          <a:p>
-            <a:pPr marL="628650" lvl="1" indent="-171450">
-              <a:buFont typeface="Arial"/>
-              <a:buChar char="•"/>
-            </a:pPr>
-            <a:r>
-              <a:rPr lang="en-US" b="0" baseline="0" dirty="0" err="1" smtClean="0"/>
-              <a:t>Flere</a:t>
-            </a:r>
-            <a:r>
-              <a:rPr lang="en-US" b="0" baseline="0" dirty="0" smtClean="0"/>
-              <a:t> PK: Compound key</a:t>
-            </a:r>
-          </a:p>
-          <a:p>
-            <a:pPr marL="628650" lvl="1" indent="-171450">
-              <a:buFont typeface="Arial"/>
-              <a:buChar char="•"/>
-            </a:pPr>
-            <a:r>
-              <a:rPr lang="en-US" b="0" baseline="0" dirty="0" err="1" smtClean="0"/>
-              <a:t>Alle</a:t>
-            </a:r>
-            <a:r>
-              <a:rPr lang="en-US" b="0" baseline="0" dirty="0" smtClean="0"/>
+              <a:rPr lang="en-US" dirty="0" smtClean="0"/>
+              <a:t>Start </a:t>
+            </a:r>
+            <a:r>
+              <a:rPr lang="en-US" dirty="0" err="1" smtClean="0"/>
+              <a:t>OpsCenter</a:t>
+            </a:r>
+            <a:r>
+              <a:rPr lang="en-US" dirty="0" smtClean="0"/>
               <a:t> </a:t>
             </a:r>
             <a:r>
-              <a:rPr lang="en-US" b="0" baseline="0" dirty="0" err="1" smtClean="0"/>
-              <a:t>må</a:t>
-            </a:r>
-            <a:r>
-              <a:rPr lang="en-US" b="0" baseline="0" dirty="0" smtClean="0"/>
-              <a:t> </a:t>
-            </a:r>
-            <a:r>
-              <a:rPr lang="en-US" b="0" baseline="0" dirty="0" err="1" smtClean="0"/>
-              <a:t>alltid</a:t>
-            </a:r>
-            <a:r>
-              <a:rPr lang="en-US" b="0" baseline="0" dirty="0" smtClean="0"/>
-              <a:t> </a:t>
-            </a:r>
-            <a:r>
-              <a:rPr lang="en-US" b="0" baseline="0" dirty="0" err="1" smtClean="0"/>
-              <a:t>være</a:t>
-            </a:r>
-            <a:r>
-              <a:rPr lang="en-US" b="0" baseline="0" dirty="0" smtClean="0"/>
-              <a:t> med (</a:t>
-            </a:r>
-            <a:r>
-              <a:rPr lang="en-US" b="0" baseline="0" dirty="0" err="1" smtClean="0"/>
-              <a:t>som</a:t>
-            </a:r>
-            <a:r>
-              <a:rPr lang="en-US" b="0" baseline="0" dirty="0" smtClean="0"/>
-              <a:t> I </a:t>
-            </a:r>
-            <a:r>
-              <a:rPr lang="en-US" b="0" baseline="0" dirty="0" err="1" smtClean="0"/>
-              <a:t>relasjonsdb</a:t>
-            </a:r>
-            <a:r>
-              <a:rPr lang="en-US" b="0" baseline="0" dirty="0" smtClean="0"/>
-              <a:t>)</a:t>
-            </a:r>
+              <a:rPr lang="en-US" dirty="0" err="1" smtClean="0"/>
+              <a:t>lokalt</a:t>
+            </a:r>
+            <a:endParaRPr lang="en-US" dirty="0" smtClean="0"/>
           </a:p>
           <a:p>
             <a:pPr marL="171450" indent="-171450">
@@ -689,138 +864,28 @@
               <a:buChar char="•"/>
             </a:pPr>
             <a:r>
-              <a:rPr lang="en-US" b="1" baseline="0" dirty="0" smtClean="0"/>
-              <a:t>C: Clustering column</a:t>
-            </a:r>
-          </a:p>
-          <a:p>
-            <a:pPr marL="628650" lvl="1" indent="-171450">
+              <a:rPr lang="en-US" dirty="0" err="1" smtClean="0"/>
+              <a:t>Koble</a:t>
+            </a:r>
+            <a:r>
+              <a:rPr lang="en-US" dirty="0" smtClean="0"/>
+              <a:t> </a:t>
+            </a:r>
+            <a:r>
+              <a:rPr lang="en-US" dirty="0" err="1" smtClean="0"/>
+              <a:t>til</a:t>
+            </a:r>
+            <a:r>
+              <a:rPr lang="en-US" dirty="0" smtClean="0"/>
+              <a:t> min node</a:t>
+            </a:r>
+          </a:p>
+          <a:p>
+            <a:pPr marL="171450" indent="-171450">
               <a:buFont typeface="Arial"/>
               <a:buChar char="•"/>
             </a:pPr>
-            <a:r>
-              <a:rPr lang="en-US" b="0" baseline="0" dirty="0" err="1" smtClean="0"/>
-              <a:t>Clustres</a:t>
-            </a:r>
-            <a:r>
-              <a:rPr lang="en-US" b="0" baseline="0" dirty="0" smtClean="0"/>
-              <a:t> </a:t>
-            </a:r>
-            <a:r>
-              <a:rPr lang="en-US" b="0" baseline="0" dirty="0" err="1" smtClean="0"/>
-              <a:t>på</a:t>
-            </a:r>
-            <a:r>
-              <a:rPr lang="en-US" b="0" baseline="0" dirty="0" smtClean="0"/>
-              <a:t> disk </a:t>
-            </a:r>
-            <a:r>
-              <a:rPr lang="en-US" b="0" baseline="0" dirty="0" err="1" smtClean="0"/>
-              <a:t>basert</a:t>
-            </a:r>
-            <a:r>
-              <a:rPr lang="en-US" b="0" baseline="0" dirty="0" smtClean="0"/>
-              <a:t> </a:t>
-            </a:r>
-            <a:r>
-              <a:rPr lang="en-US" b="0" baseline="0" dirty="0" err="1" smtClean="0"/>
-              <a:t>på</a:t>
-            </a:r>
-            <a:r>
-              <a:rPr lang="en-US" b="0" baseline="0" dirty="0" smtClean="0"/>
-              <a:t> </a:t>
-            </a:r>
-            <a:r>
-              <a:rPr lang="en-US" b="0" baseline="0" dirty="0" err="1" smtClean="0"/>
-              <a:t>denne</a:t>
-            </a:r>
-            <a:endParaRPr lang="en-US" b="0" baseline="0" dirty="0" smtClean="0"/>
-          </a:p>
-          <a:p>
-            <a:pPr marL="628650" lvl="1" indent="-171450">
-              <a:buFont typeface="Arial"/>
-              <a:buChar char="•"/>
-            </a:pPr>
-            <a:r>
-              <a:rPr lang="en-US" b="0" baseline="0" dirty="0" err="1" smtClean="0"/>
-              <a:t>Blir</a:t>
-            </a:r>
-            <a:r>
-              <a:rPr lang="en-US" b="0" baseline="0" dirty="0" smtClean="0"/>
-              <a:t> </a:t>
-            </a:r>
-            <a:r>
-              <a:rPr lang="en-US" b="0" baseline="0" dirty="0" err="1" smtClean="0"/>
-              <a:t>sortert</a:t>
-            </a:r>
-            <a:r>
-              <a:rPr lang="en-US" b="0" baseline="0" dirty="0" smtClean="0"/>
-              <a:t> </a:t>
-            </a:r>
-            <a:r>
-              <a:rPr lang="en-US" b="0" baseline="0" dirty="0" err="1" smtClean="0"/>
-              <a:t>automatisk</a:t>
-            </a:r>
-            <a:r>
-              <a:rPr lang="en-US" b="0" baseline="0" dirty="0" smtClean="0"/>
-              <a:t> </a:t>
-            </a:r>
-            <a:r>
-              <a:rPr lang="en-US" b="0" baseline="0" dirty="0" err="1" smtClean="0"/>
-              <a:t>på</a:t>
-            </a:r>
-            <a:r>
-              <a:rPr lang="en-US" b="0" baseline="0" dirty="0" smtClean="0"/>
-              <a:t> </a:t>
-            </a:r>
-            <a:r>
-              <a:rPr lang="en-US" b="0" baseline="0" dirty="0" err="1" smtClean="0"/>
-              <a:t>denne</a:t>
-            </a:r>
-            <a:endParaRPr lang="en-US" b="0" baseline="0" dirty="0" smtClean="0"/>
-          </a:p>
-          <a:p>
-            <a:pPr marL="628650" lvl="1" indent="-171450">
-              <a:buFont typeface="Arial"/>
-              <a:buChar char="•"/>
-            </a:pPr>
-            <a:r>
-              <a:rPr lang="en-US" b="0" baseline="0" dirty="0" err="1" smtClean="0"/>
-              <a:t>Foregående</a:t>
-            </a:r>
-            <a:r>
-              <a:rPr lang="en-US" b="0" baseline="0" dirty="0" smtClean="0"/>
-              <a:t> </a:t>
-            </a:r>
-            <a:r>
-              <a:rPr lang="en-US" b="0" baseline="0" dirty="0" err="1" smtClean="0"/>
-              <a:t>definerte</a:t>
-            </a:r>
-            <a:r>
-              <a:rPr lang="en-US" b="0" baseline="0" dirty="0" smtClean="0"/>
-              <a:t> Clustering columns </a:t>
-            </a:r>
-            <a:r>
-              <a:rPr lang="en-US" b="0" baseline="0" dirty="0" err="1" smtClean="0"/>
-              <a:t>må</a:t>
-            </a:r>
-            <a:r>
-              <a:rPr lang="en-US" b="0" baseline="0" dirty="0" smtClean="0"/>
-              <a:t> </a:t>
-            </a:r>
-            <a:r>
-              <a:rPr lang="en-US" b="0" baseline="0" dirty="0" err="1" smtClean="0"/>
-              <a:t>være</a:t>
-            </a:r>
-            <a:r>
-              <a:rPr lang="en-US" b="0" baseline="0" dirty="0" smtClean="0"/>
-              <a:t> med I </a:t>
-            </a:r>
-            <a:r>
-              <a:rPr lang="en-US" b="0" baseline="0" dirty="0" err="1" smtClean="0"/>
-              <a:t>spørringen</a:t>
-            </a:r>
-            <a:endParaRPr lang="en-US" b="0" baseline="0" dirty="0" smtClean="0"/>
+            <a:endParaRPr lang="en-US" dirty="0"/>
           </a:p>
         </p:txBody>
       </p:sp>
@@ -850,7 +915,7 @@
     </p:spTree>
     <p:extLst>
       <p:ext uri="{BB962C8B-B14F-4D97-AF65-F5344CB8AC3E}">
-        <p14:creationId xmlns:p14="http://schemas.microsoft.com/office/powerpoint/2010/main" val="341419617"/>
+        <p14:creationId xmlns:p14="http://schemas.microsoft.com/office/powerpoint/2010/main" val="3674016033"/>
       </p:ext>
     </p:extLst>
   </p:cSld>
@@ -924,7 +989,7 @@
             </a:pPr>
             <a:r>
               <a:rPr lang="en-US" dirty="0" err="1" smtClean="0"/>
-              <a:t>Ikke</a:t>
+              <a:t>Hørt</a:t>
             </a:r>
             <a:r>
               <a:rPr lang="en-US" dirty="0" smtClean="0"/>
@@ -932,69 +997,20 @@
             </a:r>
             <a:r>
               <a:rPr lang="en-US" dirty="0" err="1" smtClean="0"/>
-              <a:t>garanti</a:t>
-            </a:r>
-            <a:r>
-              <a:rPr lang="en-US" dirty="0" smtClean="0"/>
-              <a:t> for</a:t>
-            </a:r>
-            <a:r>
-              <a:rPr lang="en-US" baseline="0" dirty="0" smtClean="0"/>
-              <a:t> at </a:t>
-            </a:r>
-            <a:r>
-              <a:rPr lang="en-US" baseline="0" dirty="0" err="1" smtClean="0"/>
-              <a:t>neste</a:t>
-            </a:r>
-            <a:r>
-              <a:rPr lang="en-US" baseline="0" dirty="0" smtClean="0"/>
+              <a:t>om</a:t>
+            </a:r>
+            <a:r>
+              <a:rPr lang="en-US" dirty="0" smtClean="0"/>
               <a:t> </a:t>
             </a:r>
             <a:r>
-              <a:rPr lang="en-US" baseline="0" dirty="0" err="1" smtClean="0"/>
-              <a:t>transaksjon</a:t>
-            </a:r>
-            <a:r>
-              <a:rPr lang="en-US" baseline="0" dirty="0" smtClean="0"/>
-              <a:t> </a:t>
-            </a:r>
-            <a:r>
-              <a:rPr lang="en-US" baseline="0" dirty="0" err="1" smtClean="0"/>
-              <a:t>leser</a:t>
-            </a:r>
-            <a:r>
-              <a:rPr lang="en-US" baseline="0" dirty="0" smtClean="0"/>
-              <a:t> </a:t>
-            </a:r>
-            <a:r>
-              <a:rPr lang="en-US" baseline="0" dirty="0" err="1" smtClean="0"/>
-              <a:t>samme</a:t>
-            </a:r>
-            <a:r>
-              <a:rPr lang="en-US" baseline="0" dirty="0" smtClean="0"/>
-              <a:t> </a:t>
-            </a:r>
-            <a:r>
-              <a:rPr lang="en-US" baseline="0" dirty="0" err="1" smtClean="0"/>
-              <a:t>versjon</a:t>
-            </a:r>
-            <a:r>
-              <a:rPr lang="en-US" baseline="0" dirty="0" smtClean="0"/>
-              <a:t> </a:t>
-            </a:r>
-            <a:r>
-              <a:rPr lang="en-US" baseline="0" dirty="0" err="1" smtClean="0"/>
-              <a:t>av</a:t>
-            </a:r>
-            <a:r>
-              <a:rPr lang="en-US" baseline="0" dirty="0" smtClean="0"/>
-              <a:t> </a:t>
-            </a:r>
-            <a:r>
-              <a:rPr lang="en-US" baseline="0" dirty="0" err="1" smtClean="0"/>
-              <a:t>datasettet</a:t>
-            </a:r>
-            <a:endParaRPr lang="en-US" dirty="0" smtClean="0"/>
+              <a:rPr lang="en-US" dirty="0" err="1" smtClean="0"/>
+              <a:t>før</a:t>
+            </a:r>
+            <a:r>
+              <a:rPr lang="en-US" dirty="0" smtClean="0"/>
+              <a:t>?</a:t>
+            </a:r>
           </a:p>
           <a:p>
             <a:pPr marL="628650" lvl="1" indent="-171450">
@@ -1002,6 +1018,112 @@
               <a:buChar char="•"/>
             </a:pPr>
             <a:r>
+              <a:rPr lang="en-US" dirty="0" err="1" smtClean="0"/>
+              <a:t>Ikke</a:t>
+            </a:r>
+            <a:r>
+              <a:rPr lang="en-US" dirty="0" smtClean="0"/>
+              <a:t> </a:t>
+            </a:r>
+            <a:r>
+              <a:rPr lang="en-US" dirty="0" err="1" smtClean="0"/>
+              <a:t>så</a:t>
+            </a:r>
+            <a:r>
+              <a:rPr lang="en-US" dirty="0" smtClean="0"/>
+              <a:t> </a:t>
+            </a:r>
+            <a:r>
+              <a:rPr lang="en-US" dirty="0" err="1" smtClean="0"/>
+              <a:t>skummelt</a:t>
+            </a:r>
+            <a:endParaRPr lang="en-US" dirty="0" smtClean="0"/>
+          </a:p>
+          <a:p>
+            <a:pPr marL="628650" lvl="1" indent="-171450">
+              <a:buFont typeface="Arial"/>
+              <a:buChar char="•"/>
+            </a:pPr>
+            <a:r>
+              <a:rPr lang="en-US" dirty="0" err="1" smtClean="0"/>
+              <a:t>Ikke</a:t>
+            </a:r>
+            <a:r>
+              <a:rPr lang="en-US" dirty="0" smtClean="0"/>
+              <a:t> </a:t>
+            </a:r>
+            <a:r>
+              <a:rPr lang="en-US" dirty="0" err="1" smtClean="0"/>
+              <a:t>garanti</a:t>
+            </a:r>
+            <a:r>
+              <a:rPr lang="en-US" dirty="0" smtClean="0"/>
+              <a:t> for</a:t>
+            </a:r>
+            <a:r>
+              <a:rPr lang="en-US" baseline="0" dirty="0" smtClean="0"/>
+              <a:t> at </a:t>
+            </a:r>
+            <a:r>
+              <a:rPr lang="en-US" baseline="0" dirty="0" err="1" smtClean="0"/>
+              <a:t>neste</a:t>
+            </a:r>
+            <a:r>
+              <a:rPr lang="en-US" baseline="0" dirty="0" smtClean="0"/>
+              <a:t> </a:t>
+            </a:r>
+            <a:r>
+              <a:rPr lang="en-US" baseline="0" dirty="0" err="1" smtClean="0"/>
+              <a:t>transaksjon</a:t>
+            </a:r>
+            <a:r>
+              <a:rPr lang="en-US" baseline="0" dirty="0" smtClean="0"/>
+              <a:t> </a:t>
+            </a:r>
+            <a:r>
+              <a:rPr lang="en-US" baseline="0" dirty="0" err="1" smtClean="0"/>
+              <a:t>leser</a:t>
+            </a:r>
+            <a:r>
+              <a:rPr lang="en-US" baseline="0" dirty="0" smtClean="0"/>
+              <a:t> </a:t>
+            </a:r>
+            <a:r>
+              <a:rPr lang="en-US" baseline="0" dirty="0" err="1" smtClean="0"/>
+              <a:t>samme</a:t>
+            </a:r>
+            <a:r>
+              <a:rPr lang="en-US" baseline="0" dirty="0" smtClean="0"/>
+              <a:t> </a:t>
+            </a:r>
+            <a:r>
+              <a:rPr lang="en-US" baseline="0" dirty="0" err="1" smtClean="0"/>
+              <a:t>versjon</a:t>
+            </a:r>
+            <a:r>
+              <a:rPr lang="en-US" baseline="0" dirty="0" smtClean="0"/>
+              <a:t> </a:t>
+            </a:r>
+            <a:r>
+              <a:rPr lang="en-US" baseline="0" dirty="0" err="1" smtClean="0"/>
+              <a:t>av</a:t>
+            </a:r>
+            <a:r>
+              <a:rPr lang="en-US" baseline="0" dirty="0" smtClean="0"/>
+              <a:t> </a:t>
+            </a:r>
+            <a:r>
+              <a:rPr lang="en-US" baseline="0" dirty="0" err="1" smtClean="0"/>
+              <a:t>datasettet</a:t>
+            </a:r>
+            <a:endParaRPr lang="en-US" dirty="0" smtClean="0"/>
+          </a:p>
+          <a:p>
+            <a:pPr marL="628650" lvl="1" indent="-171450">
+              <a:buFont typeface="Arial"/>
+              <a:buChar char="•"/>
+            </a:pPr>
+            <a:r>
               <a:rPr lang="en-US" baseline="0" dirty="0" err="1" smtClean="0"/>
               <a:t>Snakk</a:t>
             </a:r>
@@ -1060,6 +1182,41 @@
             <a:r>
               <a:rPr lang="en-US" baseline="0" dirty="0" err="1" smtClean="0"/>
               <a:t>konsistent</a:t>
+            </a:r>
+            <a:endParaRPr lang="en-US" baseline="0" dirty="0" smtClean="0"/>
+          </a:p>
+          <a:p>
+            <a:pPr marL="1085850" lvl="2" indent="-171450">
+              <a:buFont typeface="Arial"/>
+              <a:buChar char="•"/>
+            </a:pPr>
+            <a:r>
+              <a:rPr lang="en-US" baseline="0" dirty="0" err="1" smtClean="0"/>
+              <a:t>Ikke</a:t>
+            </a:r>
+            <a:r>
+              <a:rPr lang="en-US" baseline="0" dirty="0" smtClean="0"/>
+              <a:t> ACID </a:t>
+            </a:r>
+            <a:r>
+              <a:rPr lang="en-US" baseline="0" dirty="0" err="1" smtClean="0"/>
+              <a:t>pga</a:t>
+            </a:r>
+            <a:r>
+              <a:rPr lang="en-US" baseline="0" dirty="0" smtClean="0"/>
+              <a:t> performance – bottleneck. </a:t>
+            </a:r>
+            <a:r>
+              <a:rPr lang="en-US" baseline="0" dirty="0" err="1" smtClean="0"/>
+              <a:t>Ikke</a:t>
+            </a:r>
+            <a:r>
+              <a:rPr lang="en-US" baseline="0" dirty="0" smtClean="0"/>
+              <a:t> </a:t>
+            </a:r>
+            <a:r>
+              <a:rPr lang="en-US" baseline="0" dirty="0" err="1" smtClean="0"/>
+              <a:t>behov</a:t>
             </a:r>
             <a:endParaRPr lang="en-US" baseline="0" dirty="0" smtClean="0"/>
           </a:p>
@@ -1319,7 +1476,11 @@
             </a:pPr>
             <a:r>
               <a:rPr lang="en-US" dirty="0" smtClean="0"/>
-              <a:t>Wide column store</a:t>
+              <a:t>Wide column </a:t>
+            </a:r>
+            <a:r>
+              <a:rPr lang="en-US" dirty="0" smtClean="0"/>
+              <a:t>store</a:t>
             </a:r>
           </a:p>
           <a:p>
@@ -1328,8 +1489,8 @@
               <a:buChar char="•"/>
             </a:pPr>
             <a:r>
-              <a:rPr lang="en-US" dirty="0" smtClean="0"/>
-              <a:t>Hybrid</a:t>
+              <a:rPr lang="en-US" dirty="0" err="1" smtClean="0"/>
+              <a:t>Basert</a:t>
             </a:r>
             <a:r>
               <a:rPr lang="en-US" baseline="0" dirty="0" smtClean="0"/>
@@ -1337,35 +1498,15 @@
             </a:r>
             <a:r>
               <a:rPr lang="en-US" baseline="0" dirty="0" err="1" smtClean="0"/>
-              <a:t>mellom</a:t>
+              <a:t>på</a:t>
             </a:r>
             <a:r>
               <a:rPr lang="en-US" baseline="0" dirty="0" smtClean="0"/>
-              <a:t> </a:t>
+              <a:t> Google’s </a:t>
             </a:r>
             <a:r>
               <a:rPr lang="en-US" baseline="0" dirty="0" err="1" smtClean="0"/>
-              <a:t>Tabell</a:t>
-            </a:r>
-            <a:r>
-              <a:rPr lang="en-US" baseline="0" dirty="0" smtClean="0"/>
-              <a:t>- </a:t>
-            </a:r>
-            <a:r>
-              <a:rPr lang="en-US" baseline="0" dirty="0" err="1" smtClean="0"/>
-              <a:t>og</a:t>
-            </a:r>
-            <a:r>
-              <a:rPr lang="en-US" baseline="0" dirty="0" smtClean="0"/>
-              <a:t> </a:t>
-            </a:r>
-            <a:r>
-              <a:rPr lang="en-US" baseline="0" dirty="0" smtClean="0"/>
-              <a:t>key-value-</a:t>
-            </a:r>
-            <a:r>
-              <a:rPr lang="en-US" baseline="0" dirty="0" err="1" smtClean="0"/>
-              <a:t>modell</a:t>
+              <a:t>BigTable</a:t>
             </a:r>
             <a:endParaRPr lang="en-US" baseline="0" dirty="0" smtClean="0"/>
           </a:p>
@@ -1375,30 +1516,18 @@
               <a:buChar char="•"/>
             </a:pPr>
             <a:r>
-              <a:rPr lang="en-US" baseline="0" dirty="0" smtClean="0"/>
+              <a:rPr lang="en-US" dirty="0" smtClean="0"/>
               <a:t>Cassandra </a:t>
             </a:r>
             <a:r>
-              <a:rPr lang="en-US" baseline="0" dirty="0" err="1" smtClean="0"/>
+              <a:rPr lang="en-US" dirty="0" err="1" smtClean="0"/>
               <a:t>er</a:t>
             </a:r>
             <a:r>
-              <a:rPr lang="en-US" baseline="0" dirty="0" smtClean="0"/>
-              <a:t> </a:t>
-            </a:r>
-            <a:r>
-              <a:rPr lang="en-US" baseline="0" dirty="0" err="1" smtClean="0"/>
-              <a:t>basert</a:t>
-            </a:r>
-            <a:r>
-              <a:rPr lang="en-US" baseline="0" dirty="0" smtClean="0"/>
-              <a:t> </a:t>
-            </a:r>
-            <a:r>
-              <a:rPr lang="en-US" baseline="0" dirty="0" err="1" smtClean="0"/>
-              <a:t>på</a:t>
-            </a:r>
-            <a:endParaRPr lang="en-US" baseline="0" dirty="0" smtClean="0"/>
+              <a:rPr lang="en-US" dirty="0" smtClean="0"/>
+              <a:t> en Hybrid</a:t>
+            </a:r>
+            <a:endParaRPr lang="en-US" dirty="0" smtClean="0"/>
           </a:p>
           <a:p>
             <a:pPr marL="628650" lvl="1" indent="-171450">
@@ -1406,6 +1535,28 @@
               <a:buChar char="•"/>
             </a:pPr>
             <a:r>
+              <a:rPr lang="en-US" baseline="0" dirty="0" err="1" smtClean="0"/>
+              <a:t>Basert</a:t>
+            </a:r>
+            <a:r>
+              <a:rPr lang="en-US" baseline="0" dirty="0" smtClean="0"/>
+              <a:t> </a:t>
+            </a:r>
+            <a:r>
+              <a:rPr lang="en-US" baseline="0" dirty="0" err="1" smtClean="0"/>
+              <a:t>på</a:t>
+            </a:r>
+            <a:r>
+              <a:rPr lang="en-US" baseline="0" dirty="0" smtClean="0"/>
+              <a:t>:</a:t>
+            </a:r>
+          </a:p>
+          <a:p>
+            <a:pPr marL="1085850" lvl="2" indent="-171450">
+              <a:buFont typeface="Arial"/>
+              <a:buChar char="•"/>
+            </a:pPr>
+            <a:r>
               <a:rPr lang="en-US" baseline="0" dirty="0" smtClean="0"/>
               <a:t>Google’s </a:t>
             </a:r>
@@ -1427,7 +1578,7 @@
             </a:r>
           </a:p>
           <a:p>
-            <a:pPr marL="628650" lvl="1" indent="-171450">
+            <a:pPr marL="1085850" lvl="2" indent="-171450">
               <a:buFont typeface="Arial"/>
               <a:buChar char="•"/>
             </a:pPr>
@@ -2466,10 +2617,10 @@
           <a:bodyPr/>
           <a:lstStyle/>
           <a:p>
-            <a:r>
-              <a:rPr lang="en-US" dirty="0" smtClean="0"/>
-              <a:t>- </a:t>
-            </a:r>
+            <a:pPr marL="171450" indent="-171450">
+              <a:buFontTx/>
+              <a:buChar char="-"/>
+            </a:pPr>
             <a:r>
               <a:rPr lang="en-US" dirty="0" err="1" smtClean="0"/>
               <a:t>Fokus</a:t>
@@ -2485,6 +2636,36 @@
             <a:r>
               <a:rPr lang="en-US" dirty="0" smtClean="0"/>
               <a:t> fault tolerance</a:t>
+            </a:r>
+          </a:p>
+          <a:p>
+            <a:pPr marL="171450" indent="-171450">
+              <a:buFontTx/>
+              <a:buChar char="-"/>
+            </a:pPr>
+            <a:r>
+              <a:rPr lang="en-US" dirty="0" err="1" smtClean="0"/>
+              <a:t>Noen</a:t>
+            </a:r>
+            <a:r>
+              <a:rPr lang="en-US" dirty="0" smtClean="0"/>
+              <a:t> </a:t>
+            </a:r>
+            <a:r>
+              <a:rPr lang="en-US" dirty="0" err="1" smtClean="0"/>
+              <a:t>på</a:t>
+            </a:r>
+            <a:r>
+              <a:rPr lang="en-US" dirty="0" smtClean="0"/>
+              <a:t> </a:t>
+            </a:r>
+            <a:r>
+              <a:rPr lang="en-US" dirty="0" err="1" smtClean="0"/>
+              <a:t>windowsmaskin</a:t>
+            </a:r>
+            <a:r>
+              <a:rPr lang="en-US" dirty="0" smtClean="0"/>
+              <a:t>?</a:t>
             </a:r>
             <a:endParaRPr lang="en-US" dirty="0"/>
           </a:p>
@@ -2575,22 +2756,81 @@
               <a:buChar char="•"/>
             </a:pPr>
             <a:r>
-              <a:rPr lang="en-US" dirty="0" smtClean="0"/>
-              <a:t>Start </a:t>
-            </a:r>
-            <a:r>
-              <a:rPr lang="en-US" dirty="0" err="1" smtClean="0"/>
-              <a:t>OpsCenter</a:t>
-            </a:r>
-            <a:r>
-              <a:rPr lang="en-US" dirty="0" smtClean="0"/>
+              <a:rPr lang="en-US" b="1" dirty="0" smtClean="0"/>
+              <a:t>PK:</a:t>
+            </a:r>
+            <a:r>
+              <a:rPr lang="en-US" b="1" baseline="0" dirty="0" smtClean="0"/>
+              <a:t> Primary key</a:t>
+            </a:r>
+          </a:p>
+          <a:p>
+            <a:pPr marL="628650" lvl="1" indent="-171450">
+              <a:buFont typeface="Arial"/>
+              <a:buChar char="•"/>
+            </a:pPr>
+            <a:r>
+              <a:rPr lang="en-US" b="0" baseline="0" dirty="0" err="1" smtClean="0"/>
+              <a:t>Flere</a:t>
+            </a:r>
+            <a:r>
+              <a:rPr lang="en-US" b="0" baseline="0" dirty="0" smtClean="0"/>
+              <a:t> PK: Compound key</a:t>
+            </a:r>
+          </a:p>
+          <a:p>
+            <a:pPr marL="628650" lvl="1" indent="-171450">
+              <a:buFont typeface="Arial"/>
+              <a:buChar char="•"/>
+            </a:pPr>
+            <a:r>
+              <a:rPr lang="en-US" b="0" baseline="0" dirty="0" err="1" smtClean="0"/>
+              <a:t>Alle</a:t>
+            </a:r>
+            <a:r>
+              <a:rPr lang="en-US" b="0" baseline="0" dirty="0" smtClean="0"/>
               <a:t> </a:t>
             </a:r>
             <a:r>
-              <a:rPr lang="en-US" dirty="0" err="1" smtClean="0"/>
-              <a:t>lokalt</a:t>
-            </a:r>
-            <a:endParaRPr lang="en-US" dirty="0" smtClean="0"/>
+              <a:rPr lang="en-US" b="0" baseline="0" dirty="0" err="1" smtClean="0"/>
+              <a:t>må</a:t>
+            </a:r>
+            <a:r>
+              <a:rPr lang="en-US" b="0" baseline="0" dirty="0" smtClean="0"/>
+              <a:t> </a:t>
+            </a:r>
+            <a:r>
+              <a:rPr lang="en-US" b="0" baseline="0" dirty="0" err="1" smtClean="0"/>
+              <a:t>alltid</a:t>
+            </a:r>
+            <a:r>
+              <a:rPr lang="en-US" b="0" baseline="0" dirty="0" smtClean="0"/>
+              <a:t> </a:t>
+            </a:r>
+            <a:r>
+              <a:rPr lang="en-US" b="0" baseline="0" dirty="0" err="1" smtClean="0"/>
+              <a:t>være</a:t>
+            </a:r>
+            <a:r>
+              <a:rPr lang="en-US" b="0" baseline="0" dirty="0" smtClean="0"/>
+              <a:t> med (</a:t>
+            </a:r>
+            <a:r>
+              <a:rPr lang="en-US" b="0" baseline="0" dirty="0" err="1" smtClean="0"/>
+              <a:t>som</a:t>
+            </a:r>
+            <a:r>
+              <a:rPr lang="en-US" b="0" baseline="0" dirty="0" smtClean="0"/>
+              <a:t> I </a:t>
+            </a:r>
+            <a:r>
+              <a:rPr lang="en-US" b="0" baseline="0" dirty="0" err="1" smtClean="0"/>
+              <a:t>relasjonsdb</a:t>
+            </a:r>
+            <a:r>
+              <a:rPr lang="en-US" b="0" baseline="0" dirty="0" smtClean="0"/>
+              <a:t>)</a:t>
+            </a:r>
           </a:p>
           <a:p>
             <a:pPr marL="171450" indent="-171450">
@@ -2598,28 +2838,138 @@
               <a:buChar char="•"/>
             </a:pPr>
             <a:r>
-              <a:rPr lang="en-US" dirty="0" err="1" smtClean="0"/>
-              <a:t>Koble</a:t>
-            </a:r>
-            <a:r>
-              <a:rPr lang="en-US" dirty="0" smtClean="0"/>
-              <a:t> </a:t>
-            </a:r>
-            <a:r>
-              <a:rPr lang="en-US" dirty="0" err="1" smtClean="0"/>
-              <a:t>til</a:t>
-            </a:r>
-            <a:r>
-              <a:rPr lang="en-US" dirty="0" smtClean="0"/>
-              <a:t> min node</a:t>
-            </a:r>
-          </a:p>
-          <a:p>
-            <a:pPr marL="171450" indent="-171450">
+              <a:rPr lang="en-US" b="1" baseline="0" dirty="0" smtClean="0"/>
+              <a:t>C: Clustering column</a:t>
+            </a:r>
+          </a:p>
+          <a:p>
+            <a:pPr marL="628650" lvl="1" indent="-171450">
               <a:buFont typeface="Arial"/>
               <a:buChar char="•"/>
             </a:pPr>
-            <a:endParaRPr lang="en-US" dirty="0"/>
+            <a:r>
+              <a:rPr lang="en-US" b="0" baseline="0" dirty="0" err="1" smtClean="0"/>
+              <a:t>Clustres</a:t>
+            </a:r>
+            <a:r>
+              <a:rPr lang="en-US" b="0" baseline="0" dirty="0" smtClean="0"/>
+              <a:t> </a:t>
+            </a:r>
+            <a:r>
+              <a:rPr lang="en-US" b="0" baseline="0" dirty="0" err="1" smtClean="0"/>
+              <a:t>på</a:t>
+            </a:r>
+            <a:r>
+              <a:rPr lang="en-US" b="0" baseline="0" dirty="0" smtClean="0"/>
+              <a:t> disk </a:t>
+            </a:r>
+            <a:r>
+              <a:rPr lang="en-US" b="0" baseline="0" dirty="0" err="1" smtClean="0"/>
+              <a:t>basert</a:t>
+            </a:r>
+            <a:r>
+              <a:rPr lang="en-US" b="0" baseline="0" dirty="0" smtClean="0"/>
+              <a:t> </a:t>
+            </a:r>
+            <a:r>
+              <a:rPr lang="en-US" b="0" baseline="0" dirty="0" err="1" smtClean="0"/>
+              <a:t>på</a:t>
+            </a:r>
+            <a:r>
+              <a:rPr lang="en-US" b="0" baseline="0" dirty="0" smtClean="0"/>
+              <a:t> </a:t>
+            </a:r>
+            <a:r>
+              <a:rPr lang="en-US" b="0" baseline="0" dirty="0" err="1" smtClean="0"/>
+              <a:t>denne</a:t>
+            </a:r>
+            <a:endParaRPr lang="en-US" b="0" baseline="0" dirty="0" smtClean="0"/>
+          </a:p>
+          <a:p>
+            <a:pPr marL="628650" lvl="1" indent="-171450">
+              <a:buFont typeface="Arial"/>
+              <a:buChar char="•"/>
+            </a:pPr>
+            <a:r>
+              <a:rPr lang="en-US" b="0" baseline="0" dirty="0" err="1" smtClean="0"/>
+              <a:t>Blir</a:t>
+            </a:r>
+            <a:r>
+              <a:rPr lang="en-US" b="0" baseline="0" dirty="0" smtClean="0"/>
+              <a:t> </a:t>
+            </a:r>
+            <a:r>
+              <a:rPr lang="en-US" b="0" baseline="0" dirty="0" err="1" smtClean="0"/>
+              <a:t>sortert</a:t>
+            </a:r>
+            <a:r>
+              <a:rPr lang="en-US" b="0" baseline="0" dirty="0" smtClean="0"/>
+              <a:t> </a:t>
+            </a:r>
+            <a:r>
+              <a:rPr lang="en-US" b="0" baseline="0" dirty="0" err="1" smtClean="0"/>
+              <a:t>automatisk</a:t>
+            </a:r>
+            <a:r>
+              <a:rPr lang="en-US" b="0" baseline="0" dirty="0" smtClean="0"/>
+              <a:t> </a:t>
+            </a:r>
+            <a:r>
+              <a:rPr lang="en-US" b="0" baseline="0" dirty="0" err="1" smtClean="0"/>
+              <a:t>på</a:t>
+            </a:r>
+            <a:r>
+              <a:rPr lang="en-US" b="0" baseline="0" dirty="0" smtClean="0"/>
+              <a:t> </a:t>
+            </a:r>
+            <a:r>
+              <a:rPr lang="en-US" b="0" baseline="0" dirty="0" err="1" smtClean="0"/>
+              <a:t>denne</a:t>
+            </a:r>
+            <a:endParaRPr lang="en-US" b="0" baseline="0" dirty="0" smtClean="0"/>
+          </a:p>
+          <a:p>
+            <a:pPr marL="628650" lvl="1" indent="-171450">
+              <a:buFont typeface="Arial"/>
+              <a:buChar char="•"/>
+            </a:pPr>
+            <a:r>
+              <a:rPr lang="en-US" b="0" baseline="0" dirty="0" err="1" smtClean="0"/>
+              <a:t>Foregående</a:t>
+            </a:r>
+            <a:r>
+              <a:rPr lang="en-US" b="0" baseline="0" dirty="0" smtClean="0"/>
+              <a:t> </a:t>
+            </a:r>
+            <a:r>
+              <a:rPr lang="en-US" b="0" baseline="0" dirty="0" err="1" smtClean="0"/>
+              <a:t>definerte</a:t>
+            </a:r>
+            <a:r>
+              <a:rPr lang="en-US" b="0" baseline="0" dirty="0" smtClean="0"/>
+              <a:t> Clustering columns </a:t>
+            </a:r>
+            <a:r>
+              <a:rPr lang="en-US" b="0" baseline="0" dirty="0" err="1" smtClean="0"/>
+              <a:t>må</a:t>
+            </a:r>
+            <a:r>
+              <a:rPr lang="en-US" b="0" baseline="0" dirty="0" smtClean="0"/>
+              <a:t> </a:t>
+            </a:r>
+            <a:r>
+              <a:rPr lang="en-US" b="0" baseline="0" dirty="0" err="1" smtClean="0"/>
+              <a:t>være</a:t>
+            </a:r>
+            <a:r>
+              <a:rPr lang="en-US" b="0" baseline="0" dirty="0" smtClean="0"/>
+              <a:t> med I </a:t>
+            </a:r>
+            <a:r>
+              <a:rPr lang="en-US" b="0" baseline="0" dirty="0" err="1" smtClean="0"/>
+              <a:t>spørringen</a:t>
+            </a:r>
+            <a:endParaRPr lang="en-US" b="0" baseline="0" dirty="0" smtClean="0"/>
           </a:p>
         </p:txBody>
       </p:sp>
@@ -2649,7 +2999,7 @@
     </p:spTree>
     <p:extLst>
       <p:ext uri="{BB962C8B-B14F-4D97-AF65-F5344CB8AC3E}">
-        <p14:creationId xmlns:p14="http://schemas.microsoft.com/office/powerpoint/2010/main" val="3674016033"/>
+        <p14:creationId xmlns:p14="http://schemas.microsoft.com/office/powerpoint/2010/main" val="341419617"/>
       </p:ext>
     </p:extLst>
   </p:cSld>
@@ -19550,120 +19900,6 @@
       </p:grpSpPr>
       <p:sp>
         <p:nvSpPr>
-          <p:cNvPr id="5" name="Subtitle 4"/>
-          <p:cNvSpPr>
-            <a:spLocks noGrp="1"/>
-          </p:cNvSpPr>
-          <p:nvPr>
-            <p:ph idx="1"/>
-          </p:nvPr>
-        </p:nvSpPr>
-        <p:spPr/>
-        <p:txBody>
-          <a:bodyPr/>
-          <a:lstStyle/>
-          <a:p>
-            <a:pPr marL="285750" indent="-285750">
-              <a:buFont typeface="Arial"/>
-              <a:buChar char="•"/>
-            </a:pPr>
-            <a:r>
-              <a:rPr lang="en-US" dirty="0">
-                <a:hlinkClick r:id="rId3"/>
-              </a:rPr>
-              <a:t>https://github.com/baakind/cassandra-workshop</a:t>
-            </a:r>
-            <a:r>
-              <a:rPr lang="en-US" dirty="0" smtClean="0">
-                <a:hlinkClick r:id="rId3"/>
-              </a:rPr>
-              <a:t>/</a:t>
-            </a:r>
-            <a:endParaRPr lang="en-US" dirty="0" smtClean="0"/>
-          </a:p>
-          <a:p>
-            <a:pPr marL="554038" lvl="1" indent="-285750">
-              <a:buFont typeface="Arial"/>
-              <a:buChar char="•"/>
-            </a:pPr>
-            <a:r>
-              <a:rPr lang="en-US" dirty="0" err="1" smtClean="0"/>
-              <a:t>Multinode.md</a:t>
-            </a:r>
-            <a:endParaRPr lang="en-US" dirty="0"/>
-          </a:p>
-        </p:txBody>
-      </p:sp>
-      <p:sp>
-        <p:nvSpPr>
-          <p:cNvPr id="4" name="Title 3"/>
-          <p:cNvSpPr>
-            <a:spLocks noGrp="1"/>
-          </p:cNvSpPr>
-          <p:nvPr>
-            <p:ph type="title"/>
-          </p:nvPr>
-        </p:nvSpPr>
-        <p:spPr>
-          <a:xfrm>
-            <a:off x="376445" y="294936"/>
-            <a:ext cx="2733304" cy="261610"/>
-          </a:xfrm>
-        </p:spPr>
-        <p:txBody>
-          <a:bodyPr/>
-          <a:lstStyle/>
-          <a:p>
-            <a:r>
-              <a:rPr lang="en-US" dirty="0" smtClean="0"/>
-              <a:t>Multi node cluster</a:t>
-            </a:r>
-            <a:endParaRPr lang="en-US" dirty="0"/>
-          </a:p>
-        </p:txBody>
-      </p:sp>
-    </p:spTree>
-    <p:extLst>
-      <p:ext uri="{BB962C8B-B14F-4D97-AF65-F5344CB8AC3E}">
-        <p14:creationId xmlns:p14="http://schemas.microsoft.com/office/powerpoint/2010/main" val="1545272170"/>
-      </p:ext>
-    </p:extLst>
-  </p:cSld>
-  <p:clrMapOvr>
-    <a:masterClrMapping/>
-  </p:clrMapOvr>
-  <p:transition xmlns:p14="http://schemas.microsoft.com/office/powerpoint/2010/main">
-    <p:fade thruBlk="1"/>
-  </p:transition>
-  <p:timing>
-    <p:tnLst>
-      <p:par>
-        <p:cTn xmlns:p14="http://schemas.microsoft.com/office/powerpoint/2010/main" id="1" dur="indefinite" restart="never" nodeType="tmRoot"/>
-      </p:par>
-    </p:tnLst>
-  </p:timing>
-</p:sld>
-</file>
-
-<file path=ppt/slides/slide11.xml><?xml version="1.0" encoding="utf-8"?>
-<p:sld xmlns:a="http://schemas.openxmlformats.org/drawingml/2006/main" xmlns:r="http://schemas.openxmlformats.org/officeDocument/2006/relationships" xmlns:p="http://schemas.openxmlformats.org/presentationml/2006/main">
-  <p:cSld>
-    <p:spTree>
-      <p:nvGrpSpPr>
-        <p:cNvPr id="1" name=""/>
-        <p:cNvGrpSpPr/>
-        <p:nvPr/>
-      </p:nvGrpSpPr>
-      <p:grpSpPr>
-        <a:xfrm>
-          <a:off x="0" y="0"/>
-          <a:ext cx="0" cy="0"/>
-          <a:chOff x="0" y="0"/>
-          <a:chExt cx="0" cy="0"/>
-        </a:xfrm>
-      </p:grpSpPr>
-      <p:sp>
-        <p:nvSpPr>
           <p:cNvPr id="3" name="Title 2"/>
           <p:cNvSpPr>
             <a:spLocks noGrp="1"/>
@@ -24538,6 +24774,120 @@
     <p:extLst>
       <p:ext uri="{BB962C8B-B14F-4D97-AF65-F5344CB8AC3E}">
         <p14:creationId xmlns:p14="http://schemas.microsoft.com/office/powerpoint/2010/main" val="2598851800"/>
+      </p:ext>
+    </p:extLst>
+  </p:cSld>
+  <p:clrMapOvr>
+    <a:masterClrMapping/>
+  </p:clrMapOvr>
+  <p:transition xmlns:p14="http://schemas.microsoft.com/office/powerpoint/2010/main">
+    <p:fade thruBlk="1"/>
+  </p:transition>
+  <p:timing>
+    <p:tnLst>
+      <p:par>
+        <p:cTn xmlns:p14="http://schemas.microsoft.com/office/powerpoint/2010/main" id="1" dur="indefinite" restart="never" nodeType="tmRoot"/>
+      </p:par>
+    </p:tnLst>
+  </p:timing>
+</p:sld>
+</file>
+
+<file path=ppt/slides/slide11.xml><?xml version="1.0" encoding="utf-8"?>
+<p:sld xmlns:a="http://schemas.openxmlformats.org/drawingml/2006/main" xmlns:r="http://schemas.openxmlformats.org/officeDocument/2006/relationships" xmlns:p="http://schemas.openxmlformats.org/presentationml/2006/main">
+  <p:cSld>
+    <p:spTree>
+      <p:nvGrpSpPr>
+        <p:cNvPr id="1" name=""/>
+        <p:cNvGrpSpPr/>
+        <p:nvPr/>
+      </p:nvGrpSpPr>
+      <p:grpSpPr>
+        <a:xfrm>
+          <a:off x="0" y="0"/>
+          <a:ext cx="0" cy="0"/>
+          <a:chOff x="0" y="0"/>
+          <a:chExt cx="0" cy="0"/>
+        </a:xfrm>
+      </p:grpSpPr>
+      <p:sp>
+        <p:nvSpPr>
+          <p:cNvPr id="5" name="Subtitle 4"/>
+          <p:cNvSpPr>
+            <a:spLocks noGrp="1"/>
+          </p:cNvSpPr>
+          <p:nvPr>
+            <p:ph idx="1"/>
+          </p:nvPr>
+        </p:nvSpPr>
+        <p:spPr/>
+        <p:txBody>
+          <a:bodyPr/>
+          <a:lstStyle/>
+          <a:p>
+            <a:pPr marL="285750" indent="-285750">
+              <a:buFont typeface="Arial"/>
+              <a:buChar char="•"/>
+            </a:pPr>
+            <a:r>
+              <a:rPr lang="en-US" dirty="0">
+                <a:hlinkClick r:id="rId3"/>
+              </a:rPr>
+              <a:t>https://github.com/baakind/cassandra-workshop</a:t>
+            </a:r>
+            <a:r>
+              <a:rPr lang="en-US" dirty="0" smtClean="0">
+                <a:hlinkClick r:id="rId3"/>
+              </a:rPr>
+              <a:t>/</a:t>
+            </a:r>
+            <a:endParaRPr lang="en-US" dirty="0" smtClean="0"/>
+          </a:p>
+          <a:p>
+            <a:pPr marL="554038" lvl="1" indent="-285750">
+              <a:buFont typeface="Arial"/>
+              <a:buChar char="•"/>
+            </a:pPr>
+            <a:r>
+              <a:rPr lang="en-US" dirty="0" err="1" smtClean="0"/>
+              <a:t>Multinode.md</a:t>
+            </a:r>
+            <a:endParaRPr lang="en-US" dirty="0"/>
+          </a:p>
+        </p:txBody>
+      </p:sp>
+      <p:sp>
+        <p:nvSpPr>
+          <p:cNvPr id="4" name="Title 3"/>
+          <p:cNvSpPr>
+            <a:spLocks noGrp="1"/>
+          </p:cNvSpPr>
+          <p:nvPr>
+            <p:ph type="title"/>
+          </p:nvPr>
+        </p:nvSpPr>
+        <p:spPr>
+          <a:xfrm>
+            <a:off x="376445" y="294936"/>
+            <a:ext cx="2733304" cy="261610"/>
+          </a:xfrm>
+        </p:spPr>
+        <p:txBody>
+          <a:bodyPr/>
+          <a:lstStyle/>
+          <a:p>
+            <a:r>
+              <a:rPr lang="en-US" dirty="0" smtClean="0"/>
+              <a:t>Multi node cluster</a:t>
+            </a:r>
+            <a:endParaRPr lang="en-US" dirty="0"/>
+          </a:p>
+        </p:txBody>
+      </p:sp>
+    </p:spTree>
+    <p:extLst>
+      <p:ext uri="{BB962C8B-B14F-4D97-AF65-F5344CB8AC3E}">
+        <p14:creationId xmlns:p14="http://schemas.microsoft.com/office/powerpoint/2010/main" val="1545272170"/>
       </p:ext>
     </p:extLst>
   </p:cSld>
@@ -25742,19 +26092,23 @@
             </a:r>
             <a:r>
               <a:rPr lang="en-US" dirty="0" smtClean="0"/>
+              <a:t> (</a:t>
+            </a:r>
+            <a:r>
+              <a:rPr lang="en-US" dirty="0" err="1" smtClean="0"/>
+              <a:t>av</a:t>
+            </a:r>
+            <a:r>
+              <a:rPr lang="en-US" dirty="0" smtClean="0"/>
               <a:t> </a:t>
             </a:r>
             <a:r>
               <a:rPr lang="en-US" dirty="0" err="1" smtClean="0"/>
-              <a:t>av</a:t>
-            </a:r>
-            <a:r>
-              <a:rPr lang="en-US" dirty="0" smtClean="0"/>
-              <a:t> </a:t>
-            </a:r>
-            <a:r>
-              <a:rPr lang="en-US" dirty="0" err="1" smtClean="0"/>
               <a:t>noder</a:t>
+            </a:r>
+            <a:r>
+              <a:rPr lang="en-US" dirty="0" smtClean="0"/>
+              <a:t>)</a:t>
             </a:r>
             <a:endParaRPr lang="en-US" dirty="0" smtClean="0"/>
           </a:p>

</xml_diff>